<commit_message>
updating figures on ms
</commit_message>
<xml_diff>
--- a/figures/figure1/figure1-vertical-multiple.pptx
+++ b/figures/figure1/figure1-vertical-multiple.pptx
@@ -7,8 +7,9 @@
   <p:sldIdLst>
     <p:sldId id="259" r:id="rId2"/>
     <p:sldId id="260" r:id="rId3"/>
-    <p:sldId id="261" r:id="rId4"/>
-    <p:sldId id="262" r:id="rId5"/>
+    <p:sldId id="263" r:id="rId4"/>
+    <p:sldId id="261" r:id="rId5"/>
+    <p:sldId id="262" r:id="rId6"/>
   </p:sldIdLst>
   <p:sldSz cx="18288000" cy="16459200"/>
   <p:notesSz cx="6858000" cy="9144000"/>
@@ -6914,7 +6915,7 @@
           <p:spPr>
             <a:xfrm>
               <a:off x="5832416" y="2268375"/>
-              <a:ext cx="3331307" cy="744986"/>
+              <a:ext cx="3331307" cy="517183"/>
             </a:xfrm>
             <a:prstGeom prst="rect">
               <a:avLst/>
@@ -6930,7 +6931,7 @@
               <a:pPr algn="ctr"/>
               <a:r>
                 <a:rPr lang="en-US" sz="3200" dirty="0"/>
-                <a:t>Standardize taxon names</a:t>
+                <a:t>Standardize taxon names as query</a:t>
               </a:r>
             </a:p>
           </p:txBody>
@@ -7798,7 +7799,7 @@
         </p:nvGrpSpPr>
         <p:grpSpPr>
           <a:xfrm>
-            <a:off x="10736603" y="9044473"/>
+            <a:off x="10736603" y="8985479"/>
             <a:ext cx="7414284" cy="1099776"/>
             <a:chOff x="5864774" y="2451687"/>
             <a:chExt cx="3293668" cy="427610"/>
@@ -7896,7 +7897,7 @@
               <a:pPr algn="ctr"/>
               <a:r>
                 <a:rPr lang="en-US" sz="3200" dirty="0"/>
-                <a:t>Search taxon names in chronogram database and prune</a:t>
+                <a:t>Search query taxon names in chronogram database and prune</a:t>
               </a:r>
             </a:p>
           </p:txBody>
@@ -8381,6 +8382,678 @@
           <a:chExt cx="0" cy="0"/>
         </a:xfrm>
       </p:grpSpPr>
+      <p:grpSp>
+        <p:nvGrpSpPr>
+          <p:cNvPr id="144" name="Group 143">
+            <a:extLst>
+              <a:ext uri="{FF2B5EF4-FFF2-40B4-BE49-F238E27FC236}">
+                <a16:creationId xmlns:a16="http://schemas.microsoft.com/office/drawing/2014/main" id="{85E87624-C3A8-344F-BFF0-D1E73386DCA3}"/>
+              </a:ext>
+            </a:extLst>
+          </p:cNvPr>
+          <p:cNvGrpSpPr/>
+          <p:nvPr/>
+        </p:nvGrpSpPr>
+        <p:grpSpPr>
+          <a:xfrm>
+            <a:off x="10441635" y="0"/>
+            <a:ext cx="7414284" cy="1099776"/>
+            <a:chOff x="5864774" y="2451687"/>
+            <a:chExt cx="3293668" cy="427610"/>
+          </a:xfrm>
+        </p:grpSpPr>
+        <p:sp>
+          <p:nvSpPr>
+            <p:cNvPr id="145" name="Rounded Rectangle 144">
+              <a:extLst>
+                <a:ext uri="{FF2B5EF4-FFF2-40B4-BE49-F238E27FC236}">
+                  <a16:creationId xmlns:a16="http://schemas.microsoft.com/office/drawing/2014/main" id="{ED22EF82-A6E2-0A43-B04C-C9C2E4C2EE7A}"/>
+                </a:ext>
+              </a:extLst>
+            </p:cNvPr>
+            <p:cNvSpPr/>
+            <p:nvPr/>
+          </p:nvSpPr>
+          <p:spPr>
+            <a:xfrm>
+              <a:off x="5880862" y="2451687"/>
+              <a:ext cx="3277580" cy="418840"/>
+            </a:xfrm>
+            <a:prstGeom prst="roundRect">
+              <a:avLst/>
+            </a:prstGeom>
+            <a:solidFill>
+              <a:schemeClr val="bg2">
+                <a:lumMod val="90000"/>
+              </a:schemeClr>
+            </a:solidFill>
+            <a:ln w="76200">
+              <a:solidFill>
+                <a:srgbClr val="92D050"/>
+              </a:solidFill>
+            </a:ln>
+          </p:spPr>
+          <p:style>
+            <a:lnRef idx="2">
+              <a:schemeClr val="accent1">
+                <a:shade val="50000"/>
+              </a:schemeClr>
+            </a:lnRef>
+            <a:fillRef idx="1">
+              <a:schemeClr val="accent1"/>
+            </a:fillRef>
+            <a:effectRef idx="0">
+              <a:schemeClr val="accent1"/>
+            </a:effectRef>
+            <a:fontRef idx="minor">
+              <a:schemeClr val="lt1"/>
+            </a:fontRef>
+          </p:style>
+          <p:txBody>
+            <a:bodyPr rot="0" spcFirstLastPara="0" vertOverflow="overflow" horzOverflow="overflow" vert="horz" wrap="square" lIns="91440" tIns="45720" rIns="91440" bIns="45720" numCol="1" spcCol="0" rtlCol="0" fromWordArt="0" anchor="ctr" anchorCtr="0" forceAA="0" compatLnSpc="1">
+              <a:prstTxWarp prst="textNoShape">
+                <a:avLst/>
+              </a:prstTxWarp>
+              <a:noAutofit/>
+            </a:bodyPr>
+            <a:lstStyle/>
+            <a:p>
+              <a:pPr algn="ctr"/>
+              <a:endParaRPr lang="en-US" sz="3200"/>
+            </a:p>
+          </p:txBody>
+        </p:sp>
+        <p:sp>
+          <p:nvSpPr>
+            <p:cNvPr id="146" name="TextBox 145">
+              <a:extLst>
+                <a:ext uri="{FF2B5EF4-FFF2-40B4-BE49-F238E27FC236}">
+                  <a16:creationId xmlns:a16="http://schemas.microsoft.com/office/drawing/2014/main" id="{DC8B2F48-587A-2442-B91A-18813B99D5AB}"/>
+                </a:ext>
+              </a:extLst>
+            </p:cNvPr>
+            <p:cNvSpPr txBox="1"/>
+            <p:nvPr/>
+          </p:nvSpPr>
+          <p:spPr>
+            <a:xfrm>
+              <a:off x="5864774" y="2460457"/>
+              <a:ext cx="3277581" cy="418840"/>
+            </a:xfrm>
+            <a:prstGeom prst="rect">
+              <a:avLst/>
+            </a:prstGeom>
+            <a:noFill/>
+          </p:spPr>
+          <p:txBody>
+            <a:bodyPr wrap="square" rtlCol="0">
+              <a:spAutoFit/>
+            </a:bodyPr>
+            <a:lstStyle/>
+            <a:p>
+              <a:pPr algn="ctr"/>
+              <a:r>
+                <a:rPr lang="en-US" sz="3200" dirty="0"/>
+                <a:t>Search query taxon names in chronogram database</a:t>
+              </a:r>
+            </a:p>
+          </p:txBody>
+        </p:sp>
+      </p:grpSp>
+      <p:grpSp>
+        <p:nvGrpSpPr>
+          <p:cNvPr id="147" name="Group 146">
+            <a:extLst>
+              <a:ext uri="{FF2B5EF4-FFF2-40B4-BE49-F238E27FC236}">
+                <a16:creationId xmlns:a16="http://schemas.microsoft.com/office/drawing/2014/main" id="{67870CAF-0134-5247-9C15-EA079C78E77E}"/>
+              </a:ext>
+            </a:extLst>
+          </p:cNvPr>
+          <p:cNvGrpSpPr/>
+          <p:nvPr/>
+        </p:nvGrpSpPr>
+        <p:grpSpPr>
+          <a:xfrm>
+            <a:off x="2772694" y="4218038"/>
+            <a:ext cx="4454011" cy="8916306"/>
+            <a:chOff x="5593363" y="-36535"/>
+            <a:chExt cx="2608694" cy="5222239"/>
+          </a:xfrm>
+        </p:grpSpPr>
+        <p:grpSp>
+          <p:nvGrpSpPr>
+            <p:cNvPr id="148" name="Group 147">
+              <a:extLst>
+                <a:ext uri="{FF2B5EF4-FFF2-40B4-BE49-F238E27FC236}">
+                  <a16:creationId xmlns:a16="http://schemas.microsoft.com/office/drawing/2014/main" id="{FC6365BE-3058-544B-92EC-401036B87086}"/>
+                </a:ext>
+              </a:extLst>
+            </p:cNvPr>
+            <p:cNvGrpSpPr/>
+            <p:nvPr/>
+          </p:nvGrpSpPr>
+          <p:grpSpPr>
+            <a:xfrm>
+              <a:off x="5593363" y="-36535"/>
+              <a:ext cx="2608694" cy="5222239"/>
+              <a:chOff x="5432253" y="1740632"/>
+              <a:chExt cx="2608694" cy="5222239"/>
+            </a:xfrm>
+          </p:grpSpPr>
+          <p:sp>
+            <p:nvSpPr>
+              <p:cNvPr id="150" name="Rounded Rectangle 149">
+                <a:extLst>
+                  <a:ext uri="{FF2B5EF4-FFF2-40B4-BE49-F238E27FC236}">
+                    <a16:creationId xmlns:a16="http://schemas.microsoft.com/office/drawing/2014/main" id="{D8AFE71A-BD83-4545-B1F3-827D6C4A7149}"/>
+                  </a:ext>
+                </a:extLst>
+              </p:cNvPr>
+              <p:cNvSpPr/>
+              <p:nvPr/>
+            </p:nvSpPr>
+            <p:spPr>
+              <a:xfrm rot="10800000">
+                <a:off x="5432253" y="1740632"/>
+                <a:ext cx="2608694" cy="5222239"/>
+              </a:xfrm>
+              <a:prstGeom prst="roundRect">
+                <a:avLst/>
+              </a:prstGeom>
+              <a:solidFill>
+                <a:schemeClr val="accent6">
+                  <a:lumMod val="40000"/>
+                  <a:lumOff val="60000"/>
+                </a:schemeClr>
+              </a:solidFill>
+              <a:ln w="76200">
+                <a:solidFill>
+                  <a:schemeClr val="bg1">
+                    <a:lumMod val="75000"/>
+                  </a:schemeClr>
+                </a:solidFill>
+              </a:ln>
+            </p:spPr>
+            <p:style>
+              <a:lnRef idx="2">
+                <a:schemeClr val="accent1">
+                  <a:shade val="50000"/>
+                </a:schemeClr>
+              </a:lnRef>
+              <a:fillRef idx="1">
+                <a:schemeClr val="accent1"/>
+              </a:fillRef>
+              <a:effectRef idx="0">
+                <a:schemeClr val="accent1"/>
+              </a:effectRef>
+              <a:fontRef idx="minor">
+                <a:schemeClr val="lt1"/>
+              </a:fontRef>
+            </p:style>
+            <p:txBody>
+              <a:bodyPr rot="0" spcFirstLastPara="0" vertOverflow="overflow" horzOverflow="overflow" vert="horz" wrap="square" lIns="91440" tIns="45720" rIns="91440" bIns="45720" numCol="1" spcCol="0" rtlCol="0" fromWordArt="0" anchor="ctr" anchorCtr="0" forceAA="0" compatLnSpc="1">
+                <a:prstTxWarp prst="textNoShape">
+                  <a:avLst/>
+                </a:prstTxWarp>
+                <a:noAutofit/>
+              </a:bodyPr>
+              <a:lstStyle/>
+              <a:p>
+                <a:pPr algn="ctr"/>
+                <a:endParaRPr lang="en-US" dirty="0"/>
+              </a:p>
+            </p:txBody>
+          </p:sp>
+          <p:sp>
+            <p:nvSpPr>
+              <p:cNvPr id="152" name="Rounded Rectangle 151">
+                <a:extLst>
+                  <a:ext uri="{FF2B5EF4-FFF2-40B4-BE49-F238E27FC236}">
+                    <a16:creationId xmlns:a16="http://schemas.microsoft.com/office/drawing/2014/main" id="{BD115C6B-D798-1542-A3A0-76FD18E6434A}"/>
+                  </a:ext>
+                </a:extLst>
+              </p:cNvPr>
+              <p:cNvSpPr/>
+              <p:nvPr/>
+            </p:nvSpPr>
+            <p:spPr>
+              <a:xfrm>
+                <a:off x="5596604" y="1928056"/>
+                <a:ext cx="2128684" cy="1442486"/>
+              </a:xfrm>
+              <a:prstGeom prst="roundRect">
+                <a:avLst/>
+              </a:prstGeom>
+              <a:solidFill>
+                <a:srgbClr val="D23004">
+                  <a:alpha val="69804"/>
+                </a:srgbClr>
+              </a:solidFill>
+            </p:spPr>
+            <p:style>
+              <a:lnRef idx="2">
+                <a:schemeClr val="accent1">
+                  <a:shade val="50000"/>
+                </a:schemeClr>
+              </a:lnRef>
+              <a:fillRef idx="1">
+                <a:schemeClr val="accent1"/>
+              </a:fillRef>
+              <a:effectRef idx="0">
+                <a:schemeClr val="accent1"/>
+              </a:effectRef>
+              <a:fontRef idx="minor">
+                <a:schemeClr val="lt1"/>
+              </a:fontRef>
+            </p:style>
+            <p:txBody>
+              <a:bodyPr rot="0" spcFirstLastPara="0" vertOverflow="overflow" horzOverflow="overflow" vert="horz" wrap="square" lIns="91440" tIns="45720" rIns="91440" bIns="45720" numCol="1" spcCol="0" rtlCol="0" fromWordArt="0" anchor="ctr" anchorCtr="0" forceAA="0" compatLnSpc="1">
+                <a:prstTxWarp prst="textNoShape">
+                  <a:avLst/>
+                </a:prstTxWarp>
+                <a:noAutofit/>
+              </a:bodyPr>
+              <a:lstStyle/>
+              <a:p>
+                <a:pPr algn="ctr"/>
+                <a:endParaRPr lang="en-US" dirty="0"/>
+              </a:p>
+            </p:txBody>
+          </p:sp>
+          <p:grpSp>
+            <p:nvGrpSpPr>
+              <p:cNvPr id="153" name="Group 152">
+                <a:extLst>
+                  <a:ext uri="{FF2B5EF4-FFF2-40B4-BE49-F238E27FC236}">
+                    <a16:creationId xmlns:a16="http://schemas.microsoft.com/office/drawing/2014/main" id="{0526B390-FA86-5F42-B49B-2DACE8AE6A20}"/>
+                  </a:ext>
+                </a:extLst>
+              </p:cNvPr>
+              <p:cNvGrpSpPr/>
+              <p:nvPr/>
+            </p:nvGrpSpPr>
+            <p:grpSpPr>
+              <a:xfrm>
+                <a:off x="5588400" y="5140420"/>
+                <a:ext cx="2128684" cy="1689674"/>
+                <a:chOff x="-1795260" y="7540624"/>
+                <a:chExt cx="2128684" cy="1689674"/>
+              </a:xfrm>
+            </p:grpSpPr>
+            <p:sp>
+              <p:nvSpPr>
+                <p:cNvPr id="157" name="Rounded Rectangle 156">
+                  <a:extLst>
+                    <a:ext uri="{FF2B5EF4-FFF2-40B4-BE49-F238E27FC236}">
+                      <a16:creationId xmlns:a16="http://schemas.microsoft.com/office/drawing/2014/main" id="{A5BC6F1F-3709-8E4F-BB3C-1F0B5D544C95}"/>
+                    </a:ext>
+                  </a:extLst>
+                </p:cNvPr>
+                <p:cNvSpPr/>
+                <p:nvPr/>
+              </p:nvSpPr>
+              <p:spPr>
+                <a:xfrm>
+                  <a:off x="-1795260" y="7540624"/>
+                  <a:ext cx="2128684" cy="1689674"/>
+                </a:xfrm>
+                <a:prstGeom prst="roundRect">
+                  <a:avLst/>
+                </a:prstGeom>
+                <a:solidFill>
+                  <a:srgbClr val="A2FD3B">
+                    <a:alpha val="69804"/>
+                  </a:srgbClr>
+                </a:solidFill>
+              </p:spPr>
+              <p:style>
+                <a:lnRef idx="2">
+                  <a:schemeClr val="accent1">
+                    <a:shade val="50000"/>
+                  </a:schemeClr>
+                </a:lnRef>
+                <a:fillRef idx="1">
+                  <a:schemeClr val="accent1"/>
+                </a:fillRef>
+                <a:effectRef idx="0">
+                  <a:schemeClr val="accent1"/>
+                </a:effectRef>
+                <a:fontRef idx="minor">
+                  <a:schemeClr val="lt1"/>
+                </a:fontRef>
+              </p:style>
+              <p:txBody>
+                <a:bodyPr rot="0" spcFirstLastPara="0" vertOverflow="overflow" horzOverflow="overflow" vert="horz" wrap="square" lIns="91440" tIns="45720" rIns="91440" bIns="45720" numCol="1" spcCol="0" rtlCol="0" fromWordArt="0" anchor="ctr" anchorCtr="0" forceAA="0" compatLnSpc="1">
+                  <a:prstTxWarp prst="textNoShape">
+                    <a:avLst/>
+                  </a:prstTxWarp>
+                  <a:noAutofit/>
+                </a:bodyPr>
+                <a:lstStyle/>
+                <a:p>
+                  <a:pPr algn="ctr"/>
+                  <a:endParaRPr lang="en-US" dirty="0"/>
+                </a:p>
+              </p:txBody>
+            </p:sp>
+            <p:pic>
+              <p:nvPicPr>
+                <p:cNvPr id="158" name="Picture 157">
+                  <a:extLst>
+                    <a:ext uri="{FF2B5EF4-FFF2-40B4-BE49-F238E27FC236}">
+                      <a16:creationId xmlns:a16="http://schemas.microsoft.com/office/drawing/2014/main" id="{806A56F3-D1B4-6442-B1FA-D68F4E1E9100}"/>
+                    </a:ext>
+                  </a:extLst>
+                </p:cNvPr>
+                <p:cNvPicPr>
+                  <a:picLocks noChangeAspect="1"/>
+                </p:cNvPicPr>
+                <p:nvPr/>
+              </p:nvPicPr>
+              <p:blipFill>
+                <a:blip r:embed="rId2"/>
+                <a:stretch>
+                  <a:fillRect/>
+                </a:stretch>
+              </p:blipFill>
+              <p:spPr>
+                <a:xfrm>
+                  <a:off x="-1770154" y="7695803"/>
+                  <a:ext cx="2057400" cy="1428750"/>
+                </a:xfrm>
+                <a:prstGeom prst="rect">
+                  <a:avLst/>
+                </a:prstGeom>
+              </p:spPr>
+            </p:pic>
+          </p:grpSp>
+          <p:grpSp>
+            <p:nvGrpSpPr>
+              <p:cNvPr id="154" name="Group 153">
+                <a:extLst>
+                  <a:ext uri="{FF2B5EF4-FFF2-40B4-BE49-F238E27FC236}">
+                    <a16:creationId xmlns:a16="http://schemas.microsoft.com/office/drawing/2014/main" id="{F0165D9C-68E1-DE4C-A2A1-AA871819216D}"/>
+                  </a:ext>
+                </a:extLst>
+              </p:cNvPr>
+              <p:cNvGrpSpPr/>
+              <p:nvPr/>
+            </p:nvGrpSpPr>
+            <p:grpSpPr>
+              <a:xfrm>
+                <a:off x="5588400" y="3411741"/>
+                <a:ext cx="2145091" cy="1691640"/>
+                <a:chOff x="347050" y="4140009"/>
+                <a:chExt cx="2145091" cy="1691640"/>
+              </a:xfrm>
+            </p:grpSpPr>
+            <p:sp>
+              <p:nvSpPr>
+                <p:cNvPr id="155" name="Rounded Rectangle 154">
+                  <a:extLst>
+                    <a:ext uri="{FF2B5EF4-FFF2-40B4-BE49-F238E27FC236}">
+                      <a16:creationId xmlns:a16="http://schemas.microsoft.com/office/drawing/2014/main" id="{23116181-8BC5-5343-A218-63FE05C6CFE5}"/>
+                    </a:ext>
+                  </a:extLst>
+                </p:cNvPr>
+                <p:cNvSpPr/>
+                <p:nvPr/>
+              </p:nvSpPr>
+              <p:spPr>
+                <a:xfrm>
+                  <a:off x="347050" y="4140009"/>
+                  <a:ext cx="2128684" cy="1691640"/>
+                </a:xfrm>
+                <a:prstGeom prst="roundRect">
+                  <a:avLst/>
+                </a:prstGeom>
+                <a:solidFill>
+                  <a:srgbClr val="456CE3">
+                    <a:alpha val="69804"/>
+                  </a:srgbClr>
+                </a:solidFill>
+              </p:spPr>
+              <p:style>
+                <a:lnRef idx="2">
+                  <a:schemeClr val="accent1">
+                    <a:shade val="50000"/>
+                  </a:schemeClr>
+                </a:lnRef>
+                <a:fillRef idx="1">
+                  <a:schemeClr val="accent1"/>
+                </a:fillRef>
+                <a:effectRef idx="0">
+                  <a:schemeClr val="accent1"/>
+                </a:effectRef>
+                <a:fontRef idx="minor">
+                  <a:schemeClr val="lt1"/>
+                </a:fontRef>
+              </p:style>
+              <p:txBody>
+                <a:bodyPr rot="0" spcFirstLastPara="0" vertOverflow="overflow" horzOverflow="overflow" vert="horz" wrap="square" lIns="91440" tIns="45720" rIns="91440" bIns="45720" numCol="1" spcCol="0" rtlCol="0" fromWordArt="0" anchor="ctr" anchorCtr="0" forceAA="0" compatLnSpc="1">
+                  <a:prstTxWarp prst="textNoShape">
+                    <a:avLst/>
+                  </a:prstTxWarp>
+                  <a:noAutofit/>
+                </a:bodyPr>
+                <a:lstStyle/>
+                <a:p>
+                  <a:pPr algn="ctr"/>
+                  <a:endParaRPr lang="en-US" dirty="0"/>
+                </a:p>
+              </p:txBody>
+            </p:sp>
+            <p:pic>
+              <p:nvPicPr>
+                <p:cNvPr id="156" name="Picture 155">
+                  <a:extLst>
+                    <a:ext uri="{FF2B5EF4-FFF2-40B4-BE49-F238E27FC236}">
+                      <a16:creationId xmlns:a16="http://schemas.microsoft.com/office/drawing/2014/main" id="{E6466284-A3CC-3741-8156-5FA334A7827A}"/>
+                    </a:ext>
+                  </a:extLst>
+                </p:cNvPr>
+                <p:cNvPicPr>
+                  <a:picLocks noChangeAspect="1"/>
+                </p:cNvPicPr>
+                <p:nvPr/>
+              </p:nvPicPr>
+              <p:blipFill>
+                <a:blip r:embed="rId3"/>
+                <a:stretch>
+                  <a:fillRect/>
+                </a:stretch>
+              </p:blipFill>
+              <p:spPr>
+                <a:xfrm>
+                  <a:off x="434741" y="4269374"/>
+                  <a:ext cx="2057400" cy="1428750"/>
+                </a:xfrm>
+                <a:prstGeom prst="rect">
+                  <a:avLst/>
+                </a:prstGeom>
+              </p:spPr>
+            </p:pic>
+          </p:grpSp>
+        </p:grpSp>
+        <p:pic>
+          <p:nvPicPr>
+            <p:cNvPr id="149" name="Picture 148">
+              <a:extLst>
+                <a:ext uri="{FF2B5EF4-FFF2-40B4-BE49-F238E27FC236}">
+                  <a16:creationId xmlns:a16="http://schemas.microsoft.com/office/drawing/2014/main" id="{68E916F9-90C8-8944-8061-A5849BBD1A5A}"/>
+                </a:ext>
+              </a:extLst>
+            </p:cNvPr>
+            <p:cNvPicPr>
+              <a:picLocks noChangeAspect="1"/>
+            </p:cNvPicPr>
+            <p:nvPr/>
+          </p:nvPicPr>
+          <p:blipFill>
+            <a:blip r:embed="rId4"/>
+            <a:stretch>
+              <a:fillRect/>
+            </a:stretch>
+          </p:blipFill>
+          <p:spPr>
+            <a:xfrm>
+              <a:off x="5805715" y="188013"/>
+              <a:ext cx="2057400" cy="1428750"/>
+            </a:xfrm>
+            <a:prstGeom prst="rect">
+              <a:avLst/>
+            </a:prstGeom>
+          </p:spPr>
+        </p:pic>
+      </p:grpSp>
+      <p:grpSp>
+        <p:nvGrpSpPr>
+          <p:cNvPr id="41" name="Group 40">
+            <a:extLst>
+              <a:ext uri="{FF2B5EF4-FFF2-40B4-BE49-F238E27FC236}">
+                <a16:creationId xmlns:a16="http://schemas.microsoft.com/office/drawing/2014/main" id="{5C3221EB-DF78-A943-98D4-3B34506F0445}"/>
+              </a:ext>
+            </a:extLst>
+          </p:cNvPr>
+          <p:cNvGrpSpPr/>
+          <p:nvPr/>
+        </p:nvGrpSpPr>
+        <p:grpSpPr>
+          <a:xfrm>
+            <a:off x="2980615" y="2806151"/>
+            <a:ext cx="7414284" cy="1099773"/>
+            <a:chOff x="5864774" y="2451687"/>
+            <a:chExt cx="3293668" cy="427609"/>
+          </a:xfrm>
+        </p:grpSpPr>
+        <p:sp>
+          <p:nvSpPr>
+            <p:cNvPr id="42" name="Rounded Rectangle 41">
+              <a:extLst>
+                <a:ext uri="{FF2B5EF4-FFF2-40B4-BE49-F238E27FC236}">
+                  <a16:creationId xmlns:a16="http://schemas.microsoft.com/office/drawing/2014/main" id="{A46F5B5B-1079-7E44-B815-216DA927117B}"/>
+                </a:ext>
+              </a:extLst>
+            </p:cNvPr>
+            <p:cNvSpPr/>
+            <p:nvPr/>
+          </p:nvSpPr>
+          <p:spPr>
+            <a:xfrm>
+              <a:off x="5880862" y="2451687"/>
+              <a:ext cx="3277580" cy="418840"/>
+            </a:xfrm>
+            <a:prstGeom prst="roundRect">
+              <a:avLst/>
+            </a:prstGeom>
+            <a:solidFill>
+              <a:schemeClr val="bg2">
+                <a:lumMod val="90000"/>
+              </a:schemeClr>
+            </a:solidFill>
+            <a:ln w="76200">
+              <a:solidFill>
+                <a:srgbClr val="92D050"/>
+              </a:solidFill>
+            </a:ln>
+          </p:spPr>
+          <p:style>
+            <a:lnRef idx="2">
+              <a:schemeClr val="accent1">
+                <a:shade val="50000"/>
+              </a:schemeClr>
+            </a:lnRef>
+            <a:fillRef idx="1">
+              <a:schemeClr val="accent1"/>
+            </a:fillRef>
+            <a:effectRef idx="0">
+              <a:schemeClr val="accent1"/>
+            </a:effectRef>
+            <a:fontRef idx="minor">
+              <a:schemeClr val="lt1"/>
+            </a:fontRef>
+          </p:style>
+          <p:txBody>
+            <a:bodyPr rot="0" spcFirstLastPara="0" vertOverflow="overflow" horzOverflow="overflow" vert="horz" wrap="square" lIns="91440" tIns="45720" rIns="91440" bIns="45720" numCol="1" spcCol="0" rtlCol="0" fromWordArt="0" anchor="ctr" anchorCtr="0" forceAA="0" compatLnSpc="1">
+              <a:prstTxWarp prst="textNoShape">
+                <a:avLst/>
+              </a:prstTxWarp>
+              <a:noAutofit/>
+            </a:bodyPr>
+            <a:lstStyle/>
+            <a:p>
+              <a:pPr algn="ctr"/>
+              <a:endParaRPr lang="en-US" sz="3200"/>
+            </a:p>
+          </p:txBody>
+        </p:sp>
+        <p:sp>
+          <p:nvSpPr>
+            <p:cNvPr id="43" name="TextBox 42">
+              <a:extLst>
+                <a:ext uri="{FF2B5EF4-FFF2-40B4-BE49-F238E27FC236}">
+                  <a16:creationId xmlns:a16="http://schemas.microsoft.com/office/drawing/2014/main" id="{F09C63F9-4C4A-AC46-80F9-4B5B6646143A}"/>
+                </a:ext>
+              </a:extLst>
+            </p:cNvPr>
+            <p:cNvSpPr txBox="1"/>
+            <p:nvPr/>
+          </p:nvSpPr>
+          <p:spPr>
+            <a:xfrm>
+              <a:off x="5864774" y="2460457"/>
+              <a:ext cx="3277581" cy="418839"/>
+            </a:xfrm>
+            <a:prstGeom prst="rect">
+              <a:avLst/>
+            </a:prstGeom>
+            <a:noFill/>
+          </p:spPr>
+          <p:txBody>
+            <a:bodyPr wrap="square" rtlCol="0">
+              <a:spAutoFit/>
+            </a:bodyPr>
+            <a:lstStyle/>
+            <a:p>
+              <a:pPr algn="ctr"/>
+              <a:r>
+                <a:rPr lang="en-US" sz="3200" dirty="0"/>
+                <a:t>Prune down matching chronograms tips to query taxa </a:t>
+              </a:r>
+            </a:p>
+          </p:txBody>
+        </p:sp>
+      </p:grpSp>
+    </p:spTree>
+    <p:extLst>
+      <p:ext uri="{BB962C8B-B14F-4D97-AF65-F5344CB8AC3E}">
+        <p14:creationId xmlns:p14="http://schemas.microsoft.com/office/powerpoint/2010/main" val="3197865625"/>
+      </p:ext>
+    </p:extLst>
+  </p:cSld>
+  <p:clrMapOvr>
+    <a:masterClrMapping/>
+  </p:clrMapOvr>
+</p:sld>
+</file>
+
+<file path=ppt/slides/slide4.xml><?xml version="1.0" encoding="utf-8"?>
+<p:sld xmlns:a="http://schemas.openxmlformats.org/drawingml/2006/main" xmlns:r="http://schemas.openxmlformats.org/officeDocument/2006/relationships" xmlns:p="http://schemas.openxmlformats.org/presentationml/2006/main">
+  <p:cSld>
+    <p:spTree>
+      <p:nvGrpSpPr>
+        <p:cNvPr id="1" name=""/>
+        <p:cNvGrpSpPr/>
+        <p:nvPr/>
+      </p:nvGrpSpPr>
+      <p:grpSpPr>
+        <a:xfrm>
+          <a:off x="0" y="0"/>
+          <a:ext cx="0" cy="0"/>
+          <a:chOff x="0" y="0"/>
+          <a:chExt cx="0" cy="0"/>
+        </a:xfrm>
+      </p:grpSpPr>
       <p:sp>
         <p:nvSpPr>
           <p:cNvPr id="62" name="Rounded Rectangle 61">
@@ -8395,7 +9068,7 @@
         </p:nvSpPr>
         <p:spPr>
           <a:xfrm>
-            <a:off x="10705371" y="1432265"/>
+            <a:off x="10705371" y="1461762"/>
             <a:ext cx="7566284" cy="4630465"/>
           </a:xfrm>
           <a:prstGeom prst="roundRect">
@@ -8459,10 +9132,10 @@
         </p:nvGrpSpPr>
         <p:grpSpPr>
           <a:xfrm>
-            <a:off x="10799945" y="6293513"/>
-            <a:ext cx="7265935" cy="1640908"/>
-            <a:chOff x="5845940" y="2127101"/>
-            <a:chExt cx="3331307" cy="1451240"/>
+            <a:off x="10825694" y="7149829"/>
+            <a:ext cx="7265935" cy="1647184"/>
+            <a:chOff x="5853999" y="2127101"/>
+            <a:chExt cx="3331307" cy="1456791"/>
           </a:xfrm>
           <a:noFill/>
         </p:grpSpPr>
@@ -8539,7 +9212,7 @@
           </p:nvSpPr>
           <p:spPr>
             <a:xfrm>
-              <a:off x="5845940" y="2190113"/>
+              <a:off x="5853999" y="2195664"/>
               <a:ext cx="3331307" cy="1388228"/>
             </a:xfrm>
             <a:prstGeom prst="rect">
@@ -8738,7 +9411,7 @@
 </p:sld>
 </file>
 
-<file path=ppt/slides/slide4.xml><?xml version="1.0" encoding="utf-8"?>
+<file path=ppt/slides/slide5.xml><?xml version="1.0" encoding="utf-8"?>
 <p:sld xmlns:a="http://schemas.openxmlformats.org/drawingml/2006/main" xmlns:r="http://schemas.openxmlformats.org/officeDocument/2006/relationships" xmlns:p="http://schemas.openxmlformats.org/presentationml/2006/main">
   <p:cSld>
     <p:spTree>

</xml_diff>